<commit_message>
Add Cold Fusion sample * In addition, rename each lab folder .adoc file to README.adoc * Some misceallaneous pruning * Adjust Cold Fusion example instructions
</commit_message>
<xml_diff>
--- a/presentations/Devops-Workshop.pptx
+++ b/presentations/Devops-Workshop.pptx
@@ -8,10 +8,10 @@
     <p:sldMasterId id="2147483724" r:id="rId4"/>
   </p:sldMasterIdLst>
   <p:notesMasterIdLst>
-    <p:notesMasterId r:id="rId13"/>
+    <p:notesMasterId r:id="rId12"/>
   </p:notesMasterIdLst>
   <p:handoutMasterIdLst>
-    <p:handoutMasterId r:id="rId14"/>
+    <p:handoutMasterId r:id="rId13"/>
   </p:handoutMasterIdLst>
   <p:sldIdLst>
     <p:sldId id="353" r:id="rId5"/>
@@ -20,8 +20,7 @@
     <p:sldId id="377" r:id="rId8"/>
     <p:sldId id="378" r:id="rId9"/>
     <p:sldId id="379" r:id="rId10"/>
-    <p:sldId id="375" r:id="rId11"/>
-    <p:sldId id="376" r:id="rId12"/>
+    <p:sldId id="376" r:id="rId11"/>
   </p:sldIdLst>
   <p:sldSz cx="9144000" cy="5143500" type="screen16x9"/>
   <p:notesSz cx="6858000" cy="9144000"/>
@@ -131,7 +130,6 @@
             <p14:sldId id="377"/>
             <p14:sldId id="378"/>
             <p14:sldId id="379"/>
-            <p14:sldId id="375"/>
             <p14:sldId id="376"/>
           </p14:sldIdLst>
         </p14:section>
@@ -237,7 +235,7 @@
           <a:p>
             <a:fld id="{372E5B6B-8713-8747-AE5B-F1241B2BF5F0}" type="datetimeFigureOut">
               <a:rPr lang="en-US" smtClean="0"/>
-              <a:t>9/1/17</a:t>
+              <a:t>9/29/17</a:t>
             </a:fld>
             <a:endParaRPr lang="en-US"/>
           </a:p>
@@ -403,7 +401,7 @@
           <a:p>
             <a:fld id="{7E7B7340-DDD5-1B49-81AA-25BC4050C073}" type="datetimeFigureOut">
               <a:rPr lang="en-US" smtClean="0"/>
-              <a:t>9/1/17</a:t>
+              <a:t>9/29/17</a:t>
             </a:fld>
             <a:endParaRPr lang="en-US"/>
           </a:p>
@@ -1327,123 +1325,6 @@
 </file>
 
 <file path=ppt/notesSlides/notesSlide7.xml><?xml version="1.0" encoding="utf-8"?>
-<p:notes xmlns:a="http://schemas.openxmlformats.org/drawingml/2006/main" xmlns:r="http://schemas.openxmlformats.org/officeDocument/2006/relationships" xmlns:p="http://schemas.openxmlformats.org/presentationml/2006/main" showMasterSp="0" showMasterPhAnim="0">
-  <p:cSld>
-    <p:spTree>
-      <p:nvGrpSpPr>
-        <p:cNvPr id="1" name="Shape 197"/>
-        <p:cNvGrpSpPr/>
-        <p:nvPr/>
-      </p:nvGrpSpPr>
-      <p:grpSpPr>
-        <a:xfrm>
-          <a:off x="0" y="0"/>
-          <a:ext cx="0" cy="0"/>
-          <a:chOff x="0" y="0"/>
-          <a:chExt cx="0" cy="0"/>
-        </a:xfrm>
-      </p:grpSpPr>
-      <p:sp>
-        <p:nvSpPr>
-          <p:cNvPr id="198" name="Shape 198"/>
-          <p:cNvSpPr txBox="1">
-            <a:spLocks noGrp="1"/>
-          </p:cNvSpPr>
-          <p:nvPr>
-            <p:ph type="body" idx="1"/>
-          </p:nvPr>
-        </p:nvSpPr>
-        <p:spPr>
-          <a:xfrm>
-            <a:off x="295171" y="2972430"/>
-            <a:ext cx="6267659" cy="5793719"/>
-          </a:xfrm>
-          <a:prstGeom prst="rect">
-            <a:avLst/>
-          </a:prstGeom>
-        </p:spPr>
-        <p:txBody>
-          <a:bodyPr lIns="90556" tIns="90556" rIns="90556" bIns="90556" anchor="t" anchorCtr="0">
-            <a:noAutofit/>
-          </a:bodyPr>
-          <a:lstStyle/>
-          <a:p>
-            <a:r>
-              <a:rPr lang="en-US" dirty="0" smtClean="0">
-                <a:solidFill>
-                  <a:srgbClr val="FF0000"/>
-                </a:solidFill>
-              </a:rPr>
-              <a:t>// TODO To be updated with links to Boeing repo?</a:t>
-            </a:r>
-            <a:endParaRPr dirty="0">
-              <a:solidFill>
-                <a:srgbClr val="FF0000"/>
-              </a:solidFill>
-            </a:endParaRPr>
-          </a:p>
-        </p:txBody>
-      </p:sp>
-      <p:sp>
-        <p:nvSpPr>
-          <p:cNvPr id="199" name="Shape 199"/>
-          <p:cNvSpPr>
-            <a:spLocks noGrp="1" noRot="1" noChangeAspect="1"/>
-          </p:cNvSpPr>
-          <p:nvPr>
-            <p:ph type="sldImg" idx="2"/>
-          </p:nvPr>
-        </p:nvSpPr>
-        <p:spPr>
-          <a:xfrm>
-            <a:off x="1606550" y="685800"/>
-            <a:ext cx="3702050" cy="2082800"/>
-          </a:xfrm>
-          <a:custGeom>
-            <a:avLst/>
-            <a:gdLst/>
-            <a:ahLst/>
-            <a:cxnLst/>
-            <a:rect l="0" t="0" r="0" b="0"/>
-            <a:pathLst>
-              <a:path w="120000" h="120000" extrusionOk="0">
-                <a:moveTo>
-                  <a:pt x="0" y="0"/>
-                </a:moveTo>
-                <a:lnTo>
-                  <a:pt x="120000" y="0"/>
-                </a:lnTo>
-                <a:lnTo>
-                  <a:pt x="120000" y="120000"/>
-                </a:lnTo>
-                <a:lnTo>
-                  <a:pt x="0" y="120000"/>
-                </a:lnTo>
-                <a:close/>
-              </a:path>
-            </a:pathLst>
-          </a:custGeom>
-          <a:noFill/>
-          <a:ln w="9525" cap="flat" cmpd="sng">
-            <a:solidFill>
-              <a:srgbClr val="000000"/>
-            </a:solidFill>
-            <a:prstDash val="solid"/>
-            <a:round/>
-            <a:headEnd type="none" w="med" len="med"/>
-            <a:tailEnd type="none" w="med" len="med"/>
-          </a:ln>
-        </p:spPr>
-      </p:sp>
-    </p:spTree>
-  </p:cSld>
-  <p:clrMapOvr>
-    <a:masterClrMapping/>
-  </p:clrMapOvr>
-</p:notes>
-</file>
-
-<file path=ppt/notesSlides/notesSlide8.xml><?xml version="1.0" encoding="utf-8"?>
 <p:notes xmlns:a="http://schemas.openxmlformats.org/drawingml/2006/main" xmlns:r="http://schemas.openxmlformats.org/officeDocument/2006/relationships" xmlns:p="http://schemas.openxmlformats.org/presentationml/2006/main" showMasterSp="0" showMasterPhAnim="0">
   <p:cSld>
     <p:spTree>
@@ -7628,20 +7509,6 @@
               </a:rPr>
               <a:t> Workshop</a:t>
             </a:r>
-            <a:endParaRPr lang="en-US" sz="4200" b="1" spc="-100" dirty="0" smtClean="0">
-              <a:solidFill>
-                <a:srgbClr val="00AE9E"/>
-              </a:solidFill>
-              <a:effectLst>
-                <a:outerShdw blurRad="50800" dist="38100" dir="5400000" algn="t" rotWithShape="0">
-                  <a:prstClr val="black">
-                    <a:alpha val="40000"/>
-                  </a:prstClr>
-                </a:outerShdw>
-              </a:effectLst>
-              <a:latin typeface="Arial"/>
-              <a:cs typeface="Arial"/>
-            </a:endParaRPr>
           </a:p>
         </p:txBody>
       </p:sp>
@@ -8150,12 +8017,6 @@
               </a:rPr>
               <a:t> Day 1</a:t>
             </a:r>
-            <a:endParaRPr lang="en-US" sz="3200" dirty="0">
-              <a:solidFill>
-                <a:srgbClr val="13A78D"/>
-              </a:solidFill>
-              <a:sym typeface="Arial"/>
-            </a:endParaRPr>
           </a:p>
         </p:txBody>
       </p:sp>
@@ -8654,16 +8515,7 @@
                 </a:solidFill>
                 <a:sym typeface="Arial"/>
               </a:rPr>
-              <a:t>Workshop </a:t>
-            </a:r>
-            <a:r>
-              <a:rPr lang="en-US" sz="3200" dirty="0" smtClean="0">
-                <a:solidFill>
-                  <a:srgbClr val="13A78D"/>
-                </a:solidFill>
-                <a:sym typeface="Arial"/>
-              </a:rPr>
-              <a:t>Agenda </a:t>
+              <a:t>Workshop Agenda </a:t>
             </a:r>
             <a:r>
               <a:rPr lang="mr-IN" sz="3200" dirty="0" smtClean="0">
@@ -9300,16 +9152,7 @@
                 </a:solidFill>
                 <a:sym typeface="Arial"/>
               </a:rPr>
-              <a:t>Workshop </a:t>
-            </a:r>
-            <a:r>
-              <a:rPr lang="en-US" sz="3200" dirty="0" smtClean="0">
-                <a:solidFill>
-                  <a:srgbClr val="13A78D"/>
-                </a:solidFill>
-                <a:sym typeface="Arial"/>
-              </a:rPr>
-              <a:t>Agenda </a:t>
+              <a:t>Workshop Agenda </a:t>
             </a:r>
             <a:r>
               <a:rPr lang="mr-IN" sz="3200" dirty="0" smtClean="0">
@@ -9898,16 +9741,7 @@
                 </a:solidFill>
                 <a:sym typeface="Arial"/>
               </a:rPr>
-              <a:t>Workshop </a:t>
-            </a:r>
-            <a:r>
-              <a:rPr lang="en-US" sz="3200" dirty="0" smtClean="0">
-                <a:solidFill>
-                  <a:srgbClr val="13A78D"/>
-                </a:solidFill>
-                <a:sym typeface="Arial"/>
-              </a:rPr>
-              <a:t>Agenda </a:t>
+              <a:t>Workshop Agenda </a:t>
             </a:r>
             <a:r>
               <a:rPr lang="mr-IN" sz="3200" dirty="0" smtClean="0">
@@ -10083,12 +9917,6 @@
                         </a:rPr>
                         <a:t>Practical discussion on pipeline automation </a:t>
                       </a:r>
-                      <a:r>
-                        <a:rPr lang="en-US" sz="1600" kern="1200" dirty="0" smtClean="0">
-                          <a:effectLst/>
-                        </a:rPr>
-                        <a:t/>
-                      </a:r>
                       <a:br>
                         <a:rPr lang="en-US" sz="1600" kern="1200" dirty="0" smtClean="0">
                           <a:effectLst/>
@@ -10098,19 +9926,7 @@
                         <a:rPr lang="en-US" sz="1200" kern="1200" dirty="0" smtClean="0">
                           <a:effectLst/>
                         </a:rPr>
-                        <a:t>(</a:t>
-                      </a:r>
-                      <a:r>
-                        <a:rPr lang="en-US" sz="1200" kern="1200" dirty="0" smtClean="0">
-                          <a:effectLst/>
-                        </a:rPr>
-                        <a:t>exploration of sample implementations on Jenkins and Concourse employing </a:t>
-                      </a:r>
-                      <a:r>
-                        <a:rPr lang="en-US" sz="1200" kern="1200" dirty="0" smtClean="0">
-                          <a:effectLst/>
-                        </a:rPr>
-                        <a:t/>
+                        <a:t>(exploration of sample implementations on Jenkins and Concourse employing </a:t>
                       </a:r>
                       <a:br>
                         <a:rPr lang="en-US" sz="1200" kern="1200" dirty="0" smtClean="0">
@@ -10121,13 +9937,7 @@
                         <a:rPr lang="en-US" sz="1200" kern="1200" dirty="0" smtClean="0">
                           <a:effectLst/>
                         </a:rPr>
-                        <a:t>Spring </a:t>
-                      </a:r>
-                      <a:r>
-                        <a:rPr lang="en-US" sz="1200" kern="1200" dirty="0" smtClean="0">
-                          <a:effectLst/>
-                        </a:rPr>
-                        <a:t>Cloud Pipelines)</a:t>
+                        <a:t>Spring Cloud Pipelines)</a:t>
                       </a:r>
                       <a:endParaRPr lang="en-US" sz="1200" kern="1200" dirty="0" smtClean="0">
                         <a:solidFill>
@@ -10273,334 +10083,6 @@
           <a:bodyPr/>
           <a:lstStyle/>
           <a:p>
-            <a:pPr lvl="0"/>
-            <a:r>
-              <a:rPr lang="en-US" sz="3200" dirty="0" smtClean="0">
-                <a:solidFill>
-                  <a:srgbClr val="13A78D"/>
-                </a:solidFill>
-                <a:sym typeface="Arial"/>
-              </a:rPr>
-              <a:t>Important Links</a:t>
-            </a:r>
-            <a:endParaRPr lang="en-US" sz="3200" dirty="0">
-              <a:solidFill>
-                <a:srgbClr val="13A78D"/>
-              </a:solidFill>
-              <a:sym typeface="Arial"/>
-            </a:endParaRPr>
-          </a:p>
-        </p:txBody>
-      </p:sp>
-      <p:sp>
-        <p:nvSpPr>
-          <p:cNvPr id="196" name="Shape 196"/>
-          <p:cNvSpPr txBox="1">
-            <a:spLocks noGrp="1"/>
-          </p:cNvSpPr>
-          <p:nvPr>
-            <p:ph type="body" sz="quarter" idx="13"/>
-          </p:nvPr>
-        </p:nvSpPr>
-        <p:spPr>
-          <a:xfrm>
-            <a:off x="359241" y="968796"/>
-            <a:ext cx="9078863" cy="3848609"/>
-          </a:xfrm>
-        </p:spPr>
-        <p:txBody>
-          <a:bodyPr/>
-          <a:lstStyle/>
-          <a:p>
-            <a:pPr marL="285750" lvl="0" indent="-285750">
-              <a:buClr>
-                <a:srgbClr val="008774"/>
-              </a:buClr>
-              <a:buFont typeface="Arial"/>
-              <a:buChar char="•"/>
-            </a:pPr>
-            <a:r>
-              <a:rPr lang="en-US" sz="2400" dirty="0" smtClean="0">
-                <a:solidFill>
-                  <a:srgbClr val="13A78D"/>
-                </a:solidFill>
-                <a:sym typeface="Arial"/>
-              </a:rPr>
-              <a:t>Workshop </a:t>
-            </a:r>
-            <a:r>
-              <a:rPr lang="en-US" sz="2400" dirty="0" err="1" smtClean="0">
-                <a:solidFill>
-                  <a:srgbClr val="13A78D"/>
-                </a:solidFill>
-                <a:sym typeface="Arial"/>
-              </a:rPr>
-              <a:t>Git</a:t>
-            </a:r>
-            <a:r>
-              <a:rPr lang="en-US" sz="2400" dirty="0" smtClean="0">
-                <a:solidFill>
-                  <a:srgbClr val="13A78D"/>
-                </a:solidFill>
-                <a:sym typeface="Arial"/>
-              </a:rPr>
-              <a:t> Repo</a:t>
-            </a:r>
-          </a:p>
-          <a:p>
-            <a:pPr marL="1028700" lvl="1">
-              <a:buClr>
-                <a:srgbClr val="008774"/>
-              </a:buClr>
-              <a:buFont typeface="Arial"/>
-              <a:buChar char="•"/>
-            </a:pPr>
-            <a:r>
-              <a:rPr lang="en-US" sz="2000" dirty="0">
-                <a:solidFill>
-                  <a:schemeClr val="accent6"/>
-                </a:solidFill>
-                <a:sym typeface="Arial"/>
-              </a:rPr>
-              <a:t>https://</a:t>
-            </a:r>
-            <a:r>
-              <a:rPr lang="en-US" sz="2000" dirty="0" err="1" smtClean="0">
-                <a:solidFill>
-                  <a:schemeClr val="accent6"/>
-                </a:solidFill>
-                <a:sym typeface="Arial"/>
-              </a:rPr>
-              <a:t>github.com</a:t>
-            </a:r>
-            <a:r>
-              <a:rPr lang="en-US" sz="2000" dirty="0" smtClean="0">
-                <a:solidFill>
-                  <a:schemeClr val="accent6"/>
-                </a:solidFill>
-                <a:sym typeface="Arial"/>
-              </a:rPr>
-              <a:t>/Pivotal-Field-Engineering/CN-Workshop-Boeing</a:t>
-            </a:r>
-            <a:br>
-              <a:rPr lang="en-US" sz="2000" dirty="0" smtClean="0">
-                <a:solidFill>
-                  <a:schemeClr val="accent6"/>
-                </a:solidFill>
-                <a:sym typeface="Arial"/>
-              </a:rPr>
-            </a:br>
-            <a:endParaRPr lang="en-US" sz="2000" dirty="0" smtClean="0">
-              <a:solidFill>
-                <a:schemeClr val="accent6"/>
-              </a:solidFill>
-              <a:sym typeface="Arial"/>
-            </a:endParaRPr>
-          </a:p>
-          <a:p>
-            <a:pPr marL="285750" lvl="0" indent="-285750">
-              <a:buClr>
-                <a:srgbClr val="008774"/>
-              </a:buClr>
-              <a:buFont typeface="Arial"/>
-              <a:buChar char="•"/>
-            </a:pPr>
-            <a:r>
-              <a:rPr lang="en-US" sz="2400" dirty="0" smtClean="0">
-                <a:solidFill>
-                  <a:srgbClr val="13A78D"/>
-                </a:solidFill>
-                <a:sym typeface="Arial"/>
-              </a:rPr>
-              <a:t>Cloud Foundry API</a:t>
-            </a:r>
-          </a:p>
-          <a:p>
-            <a:pPr marL="1028700" lvl="1">
-              <a:buClr>
-                <a:srgbClr val="008774"/>
-              </a:buClr>
-              <a:buFont typeface="Arial"/>
-              <a:buChar char="•"/>
-            </a:pPr>
-            <a:r>
-              <a:rPr lang="en-US" sz="2000" dirty="0" smtClean="0">
-                <a:solidFill>
-                  <a:schemeClr val="accent6"/>
-                </a:solidFill>
-                <a:sym typeface="Arial"/>
-              </a:rPr>
-              <a:t>https://</a:t>
-            </a:r>
-            <a:r>
-              <a:rPr lang="en-US" sz="2000" dirty="0" err="1" smtClean="0">
-                <a:solidFill>
-                  <a:schemeClr val="accent6"/>
-                </a:solidFill>
-                <a:sym typeface="Arial"/>
-              </a:rPr>
-              <a:t>api.run.pivotal.io</a:t>
-            </a:r>
-            <a:r>
-              <a:rPr lang="en-US" sz="2000" dirty="0" smtClean="0">
-                <a:solidFill>
-                  <a:schemeClr val="accent6"/>
-                </a:solidFill>
-                <a:sym typeface="Arial"/>
-              </a:rPr>
-              <a:t/>
-            </a:r>
-            <a:br>
-              <a:rPr lang="en-US" sz="2000" dirty="0" smtClean="0">
-                <a:solidFill>
-                  <a:schemeClr val="accent6"/>
-                </a:solidFill>
-                <a:sym typeface="Arial"/>
-              </a:rPr>
-            </a:br>
-            <a:endParaRPr lang="en-US" sz="2000" dirty="0" smtClean="0">
-              <a:solidFill>
-                <a:schemeClr val="accent6"/>
-              </a:solidFill>
-              <a:sym typeface="Arial"/>
-            </a:endParaRPr>
-          </a:p>
-          <a:p>
-            <a:pPr marL="285750" lvl="0" indent="-285750">
-              <a:buClr>
-                <a:srgbClr val="008774"/>
-              </a:buClr>
-              <a:buFont typeface="Arial"/>
-              <a:buChar char="•"/>
-            </a:pPr>
-            <a:r>
-              <a:rPr lang="en-US" sz="2400" dirty="0" smtClean="0">
-                <a:solidFill>
-                  <a:srgbClr val="13A78D"/>
-                </a:solidFill>
-                <a:sym typeface="Arial"/>
-              </a:rPr>
-              <a:t>Cloud Foundry Apps Manager</a:t>
-            </a:r>
-          </a:p>
-          <a:p>
-            <a:pPr marL="1028700" lvl="1">
-              <a:buClr>
-                <a:srgbClr val="008774"/>
-              </a:buClr>
-              <a:buFont typeface="Arial"/>
-              <a:buChar char="•"/>
-            </a:pPr>
-            <a:r>
-              <a:rPr lang="en-US" sz="2000" dirty="0" smtClean="0">
-                <a:solidFill>
-                  <a:schemeClr val="accent6"/>
-                </a:solidFill>
-                <a:sym typeface="Arial"/>
-              </a:rPr>
-              <a:t>https://</a:t>
-            </a:r>
-            <a:r>
-              <a:rPr lang="en-US" sz="2000" dirty="0" err="1" smtClean="0">
-                <a:solidFill>
-                  <a:schemeClr val="accent6"/>
-                </a:solidFill>
-                <a:sym typeface="Arial"/>
-              </a:rPr>
-              <a:t>console.run.pivotal.io</a:t>
-            </a:r>
-            <a:endParaRPr lang="en-US" sz="2000" dirty="0" smtClean="0">
-              <a:solidFill>
-                <a:schemeClr val="accent6"/>
-              </a:solidFill>
-              <a:sym typeface="Arial"/>
-            </a:endParaRPr>
-          </a:p>
-        </p:txBody>
-      </p:sp>
-      <p:sp>
-        <p:nvSpPr>
-          <p:cNvPr id="4" name="Slide Number Placeholder 1"/>
-          <p:cNvSpPr>
-            <a:spLocks noGrp="1"/>
-          </p:cNvSpPr>
-          <p:nvPr>
-            <p:ph type="sldNum" sz="quarter" idx="12"/>
-          </p:nvPr>
-        </p:nvSpPr>
-        <p:spPr>
-          <a:xfrm>
-            <a:off x="48247" y="4848095"/>
-            <a:ext cx="373338" cy="273844"/>
-          </a:xfrm>
-        </p:spPr>
-        <p:txBody>
-          <a:bodyPr/>
-          <a:lstStyle/>
-          <a:p>
-            <a:fld id="{ADA07C09-8A41-3B46-A636-3955072BBB4F}" type="slidenum">
-              <a:rPr lang="en-US" smtClean="0"/>
-              <a:t>7</a:t>
-            </a:fld>
-            <a:endParaRPr lang="en-US" dirty="0"/>
-          </a:p>
-        </p:txBody>
-      </p:sp>
-    </p:spTree>
-    <p:extLst>
-      <p:ext uri="{BB962C8B-B14F-4D97-AF65-F5344CB8AC3E}">
-        <p14:creationId xmlns:p14="http://schemas.microsoft.com/office/powerpoint/2010/main" val="2709767938"/>
-      </p:ext>
-    </p:extLst>
-  </p:cSld>
-  <p:clrMapOvr>
-    <a:masterClrMapping/>
-  </p:clrMapOvr>
-  <p:transition>
-    <p:fade/>
-  </p:transition>
-  <p:timing>
-    <p:tnLst>
-      <p:par>
-        <p:cTn id="1" dur="indefinite" restart="never" nodeType="tmRoot"/>
-      </p:par>
-    </p:tnLst>
-  </p:timing>
-</p:sld>
-</file>
-
-<file path=ppt/slides/slide8.xml><?xml version="1.0" encoding="utf-8"?>
-<p:sld xmlns:a="http://schemas.openxmlformats.org/drawingml/2006/main" xmlns:r="http://schemas.openxmlformats.org/officeDocument/2006/relationships" xmlns:p="http://schemas.openxmlformats.org/presentationml/2006/main">
-  <p:cSld>
-    <p:spTree>
-      <p:nvGrpSpPr>
-        <p:cNvPr id="1" name="Shape 194"/>
-        <p:cNvGrpSpPr/>
-        <p:nvPr/>
-      </p:nvGrpSpPr>
-      <p:grpSpPr>
-        <a:xfrm>
-          <a:off x="0" y="0"/>
-          <a:ext cx="0" cy="0"/>
-          <a:chOff x="0" y="0"/>
-          <a:chExt cx="0" cy="0"/>
-        </a:xfrm>
-      </p:grpSpPr>
-      <p:sp>
-        <p:nvSpPr>
-          <p:cNvPr id="195" name="Shape 195"/>
-          <p:cNvSpPr txBox="1">
-            <a:spLocks noGrp="1"/>
-          </p:cNvSpPr>
-          <p:nvPr>
-            <p:ph type="title"/>
-          </p:nvPr>
-        </p:nvSpPr>
-        <p:spPr/>
-        <p:txBody>
-          <a:bodyPr/>
-          <a:lstStyle/>
-          <a:p>
             <a:pPr lvl="0" algn="ctr"/>
             <a:r>
               <a:rPr lang="en-US" sz="3200" dirty="0" smtClean="0">
@@ -10642,7 +10124,7 @@
           <a:p>
             <a:fld id="{ADA07C09-8A41-3B46-A636-3955072BBB4F}" type="slidenum">
               <a:rPr lang="en-US" smtClean="0"/>
-              <a:t>8</a:t>
+              <a:t>7</a:t>
             </a:fld>
             <a:endParaRPr lang="en-US" dirty="0"/>
           </a:p>

</xml_diff>